<commit_message>
Added resnet. Presentation final thoughts
</commit_message>
<xml_diff>
--- a/documents/Deep Learning with Neural Nets.pptx
+++ b/documents/Deep Learning with Neural Nets.pptx
@@ -5,7 +5,7 @@
     <p:sldMasterId id="2147483660" r:id="rId1"/>
   </p:sldMasterIdLst>
   <p:notesMasterIdLst>
-    <p:notesMasterId r:id="rId12"/>
+    <p:notesMasterId r:id="rId15"/>
   </p:notesMasterIdLst>
   <p:sldIdLst>
     <p:sldId id="265" r:id="rId2"/>
@@ -18,6 +18,9 @@
     <p:sldId id="273" r:id="rId9"/>
     <p:sldId id="272" r:id="rId10"/>
     <p:sldId id="274" r:id="rId11"/>
+    <p:sldId id="275" r:id="rId12"/>
+    <p:sldId id="276" r:id="rId13"/>
+    <p:sldId id="277" r:id="rId14"/>
   </p:sldIdLst>
   <p:sldSz cx="12192000" cy="6858000"/>
   <p:notesSz cx="6858000" cy="9144000"/>
@@ -206,7 +209,7 @@
           <a:p>
             <a:fld id="{4351FD99-EF60-4F7F-840E-5BF7FDD46972}" type="datetimeFigureOut">
               <a:rPr lang="en-ZA" smtClean="0"/>
-              <a:t>17/07/2018</a:t>
+              <a:t>2018/07/22</a:t>
             </a:fld>
             <a:endParaRPr lang="en-ZA"/>
           </a:p>
@@ -642,6 +645,258 @@
 </p:notes>
 </file>
 
+<file path=ppt/notesSlides/notesSlide11.xml><?xml version="1.0" encoding="utf-8"?>
+<p:notes xmlns:a="http://schemas.openxmlformats.org/drawingml/2006/main" xmlns:r="http://schemas.openxmlformats.org/officeDocument/2006/relationships" xmlns:p="http://schemas.openxmlformats.org/presentationml/2006/main">
+  <p:cSld>
+    <p:spTree>
+      <p:nvGrpSpPr>
+        <p:cNvPr id="1" name=""/>
+        <p:cNvGrpSpPr/>
+        <p:nvPr/>
+      </p:nvGrpSpPr>
+      <p:grpSpPr>
+        <a:xfrm>
+          <a:off x="0" y="0"/>
+          <a:ext cx="0" cy="0"/>
+          <a:chOff x="0" y="0"/>
+          <a:chExt cx="0" cy="0"/>
+        </a:xfrm>
+      </p:grpSpPr>
+      <p:sp>
+        <p:nvSpPr>
+          <p:cNvPr id="2" name="Slide Image Placeholder 1"/>
+          <p:cNvSpPr>
+            <a:spLocks noGrp="1" noRot="1" noChangeAspect="1"/>
+          </p:cNvSpPr>
+          <p:nvPr>
+            <p:ph type="sldImg"/>
+          </p:nvPr>
+        </p:nvSpPr>
+        <p:spPr/>
+      </p:sp>
+      <p:sp>
+        <p:nvSpPr>
+          <p:cNvPr id="3" name="Notes Placeholder 2"/>
+          <p:cNvSpPr>
+            <a:spLocks noGrp="1"/>
+          </p:cNvSpPr>
+          <p:nvPr>
+            <p:ph type="body" idx="1"/>
+          </p:nvPr>
+        </p:nvSpPr>
+        <p:spPr/>
+        <p:txBody>
+          <a:bodyPr/>
+          <a:lstStyle/>
+          <a:p>
+            <a:endParaRPr lang="en-US" dirty="0"/>
+          </a:p>
+        </p:txBody>
+      </p:sp>
+      <p:sp>
+        <p:nvSpPr>
+          <p:cNvPr id="4" name="Slide Number Placeholder 3"/>
+          <p:cNvSpPr>
+            <a:spLocks noGrp="1"/>
+          </p:cNvSpPr>
+          <p:nvPr>
+            <p:ph type="sldNum" sz="quarter" idx="10"/>
+          </p:nvPr>
+        </p:nvSpPr>
+        <p:spPr/>
+        <p:txBody>
+          <a:bodyPr/>
+          <a:lstStyle/>
+          <a:p>
+            <a:fld id="{E3D2DDD7-AF68-3B48-BD14-1B1798152336}" type="slidenum">
+              <a:rPr lang="en-US" smtClean="0"/>
+              <a:t>11</a:t>
+            </a:fld>
+            <a:endParaRPr lang="en-US" dirty="0"/>
+          </a:p>
+        </p:txBody>
+      </p:sp>
+    </p:spTree>
+    <p:extLst>
+      <p:ext uri="{BB962C8B-B14F-4D97-AF65-F5344CB8AC3E}">
+        <p14:creationId xmlns:p14="http://schemas.microsoft.com/office/powerpoint/2010/main" val="1882230671"/>
+      </p:ext>
+    </p:extLst>
+  </p:cSld>
+  <p:clrMapOvr>
+    <a:masterClrMapping/>
+  </p:clrMapOvr>
+</p:notes>
+</file>
+
+<file path=ppt/notesSlides/notesSlide12.xml><?xml version="1.0" encoding="utf-8"?>
+<p:notes xmlns:a="http://schemas.openxmlformats.org/drawingml/2006/main" xmlns:r="http://schemas.openxmlformats.org/officeDocument/2006/relationships" xmlns:p="http://schemas.openxmlformats.org/presentationml/2006/main">
+  <p:cSld>
+    <p:spTree>
+      <p:nvGrpSpPr>
+        <p:cNvPr id="1" name=""/>
+        <p:cNvGrpSpPr/>
+        <p:nvPr/>
+      </p:nvGrpSpPr>
+      <p:grpSpPr>
+        <a:xfrm>
+          <a:off x="0" y="0"/>
+          <a:ext cx="0" cy="0"/>
+          <a:chOff x="0" y="0"/>
+          <a:chExt cx="0" cy="0"/>
+        </a:xfrm>
+      </p:grpSpPr>
+      <p:sp>
+        <p:nvSpPr>
+          <p:cNvPr id="2" name="Slide Image Placeholder 1"/>
+          <p:cNvSpPr>
+            <a:spLocks noGrp="1" noRot="1" noChangeAspect="1"/>
+          </p:cNvSpPr>
+          <p:nvPr>
+            <p:ph type="sldImg"/>
+          </p:nvPr>
+        </p:nvSpPr>
+        <p:spPr/>
+      </p:sp>
+      <p:sp>
+        <p:nvSpPr>
+          <p:cNvPr id="3" name="Notes Placeholder 2"/>
+          <p:cNvSpPr>
+            <a:spLocks noGrp="1"/>
+          </p:cNvSpPr>
+          <p:nvPr>
+            <p:ph type="body" idx="1"/>
+          </p:nvPr>
+        </p:nvSpPr>
+        <p:spPr/>
+        <p:txBody>
+          <a:bodyPr/>
+          <a:lstStyle/>
+          <a:p>
+            <a:endParaRPr lang="en-US" dirty="0"/>
+          </a:p>
+        </p:txBody>
+      </p:sp>
+      <p:sp>
+        <p:nvSpPr>
+          <p:cNvPr id="4" name="Slide Number Placeholder 3"/>
+          <p:cNvSpPr>
+            <a:spLocks noGrp="1"/>
+          </p:cNvSpPr>
+          <p:nvPr>
+            <p:ph type="sldNum" sz="quarter" idx="10"/>
+          </p:nvPr>
+        </p:nvSpPr>
+        <p:spPr/>
+        <p:txBody>
+          <a:bodyPr/>
+          <a:lstStyle/>
+          <a:p>
+            <a:fld id="{E3D2DDD7-AF68-3B48-BD14-1B1798152336}" type="slidenum">
+              <a:rPr lang="en-US" smtClean="0"/>
+              <a:t>12</a:t>
+            </a:fld>
+            <a:endParaRPr lang="en-US" dirty="0"/>
+          </a:p>
+        </p:txBody>
+      </p:sp>
+    </p:spTree>
+    <p:extLst>
+      <p:ext uri="{BB962C8B-B14F-4D97-AF65-F5344CB8AC3E}">
+        <p14:creationId xmlns:p14="http://schemas.microsoft.com/office/powerpoint/2010/main" val="1726812169"/>
+      </p:ext>
+    </p:extLst>
+  </p:cSld>
+  <p:clrMapOvr>
+    <a:masterClrMapping/>
+  </p:clrMapOvr>
+</p:notes>
+</file>
+
+<file path=ppt/notesSlides/notesSlide13.xml><?xml version="1.0" encoding="utf-8"?>
+<p:notes xmlns:a="http://schemas.openxmlformats.org/drawingml/2006/main" xmlns:r="http://schemas.openxmlformats.org/officeDocument/2006/relationships" xmlns:p="http://schemas.openxmlformats.org/presentationml/2006/main">
+  <p:cSld>
+    <p:spTree>
+      <p:nvGrpSpPr>
+        <p:cNvPr id="1" name=""/>
+        <p:cNvGrpSpPr/>
+        <p:nvPr/>
+      </p:nvGrpSpPr>
+      <p:grpSpPr>
+        <a:xfrm>
+          <a:off x="0" y="0"/>
+          <a:ext cx="0" cy="0"/>
+          <a:chOff x="0" y="0"/>
+          <a:chExt cx="0" cy="0"/>
+        </a:xfrm>
+      </p:grpSpPr>
+      <p:sp>
+        <p:nvSpPr>
+          <p:cNvPr id="2" name="Slide Image Placeholder 1"/>
+          <p:cNvSpPr>
+            <a:spLocks noGrp="1" noRot="1" noChangeAspect="1"/>
+          </p:cNvSpPr>
+          <p:nvPr>
+            <p:ph type="sldImg"/>
+          </p:nvPr>
+        </p:nvSpPr>
+        <p:spPr/>
+      </p:sp>
+      <p:sp>
+        <p:nvSpPr>
+          <p:cNvPr id="3" name="Notes Placeholder 2"/>
+          <p:cNvSpPr>
+            <a:spLocks noGrp="1"/>
+          </p:cNvSpPr>
+          <p:nvPr>
+            <p:ph type="body" idx="1"/>
+          </p:nvPr>
+        </p:nvSpPr>
+        <p:spPr/>
+        <p:txBody>
+          <a:bodyPr/>
+          <a:lstStyle/>
+          <a:p>
+            <a:endParaRPr lang="en-US" dirty="0"/>
+          </a:p>
+        </p:txBody>
+      </p:sp>
+      <p:sp>
+        <p:nvSpPr>
+          <p:cNvPr id="4" name="Slide Number Placeholder 3"/>
+          <p:cNvSpPr>
+            <a:spLocks noGrp="1"/>
+          </p:cNvSpPr>
+          <p:nvPr>
+            <p:ph type="sldNum" sz="quarter" idx="10"/>
+          </p:nvPr>
+        </p:nvSpPr>
+        <p:spPr/>
+        <p:txBody>
+          <a:bodyPr/>
+          <a:lstStyle/>
+          <a:p>
+            <a:fld id="{E3D2DDD7-AF68-3B48-BD14-1B1798152336}" type="slidenum">
+              <a:rPr lang="en-US" smtClean="0"/>
+              <a:t>13</a:t>
+            </a:fld>
+            <a:endParaRPr lang="en-US" dirty="0"/>
+          </a:p>
+        </p:txBody>
+      </p:sp>
+    </p:spTree>
+    <p:extLst>
+      <p:ext uri="{BB962C8B-B14F-4D97-AF65-F5344CB8AC3E}">
+        <p14:creationId xmlns:p14="http://schemas.microsoft.com/office/powerpoint/2010/main" val="2425840293"/>
+      </p:ext>
+    </p:extLst>
+  </p:cSld>
+  <p:clrMapOvr>
+    <a:masterClrMapping/>
+  </p:clrMapOvr>
+</p:notes>
+</file>
+
 <file path=ppt/notesSlides/notesSlide2.xml><?xml version="1.0" encoding="utf-8"?>
 <p:notes xmlns:a="http://schemas.openxmlformats.org/drawingml/2006/main" xmlns:r="http://schemas.openxmlformats.org/officeDocument/2006/relationships" xmlns:p="http://schemas.openxmlformats.org/presentationml/2006/main">
   <p:cSld>
@@ -1544,7 +1799,7 @@
           <a:p>
             <a:fld id="{8F3446E0-CE5B-4FDD-89DD-7D7F41207656}" type="datetimeFigureOut">
               <a:rPr lang="en-ZA" smtClean="0"/>
-              <a:t>17/07/2018</a:t>
+              <a:t>2018/07/22</a:t>
             </a:fld>
             <a:endParaRPr lang="en-ZA"/>
           </a:p>
@@ -2159,15 +2414,7 @@
                   <a:srgbClr val="F2B210"/>
                 </a:solidFill>
               </a:rPr>
-              <a:t>Microsoft </a:t>
-            </a:r>
-            <a:r>
-              <a:rPr lang="en-US" sz="3200" b="1" dirty="0" smtClean="0">
-                <a:solidFill>
-                  <a:srgbClr val="F2B210"/>
-                </a:solidFill>
-              </a:rPr>
-              <a:t>Tech Session – Machine Learning</a:t>
+              <a:t>Microsoft Tech Session – Deep Learning</a:t>
             </a:r>
             <a:endParaRPr lang="en-ZA" sz="3200" dirty="0"/>
           </a:p>
@@ -2202,12 +2449,8 @@
           <a:lstStyle/>
           <a:p>
             <a:r>
-              <a:rPr lang="en-ZA" dirty="0" smtClean="0"/>
-              <a:t>25 July </a:t>
-            </a:r>
-            <a:r>
               <a:rPr lang="en-ZA" dirty="0"/>
-              <a:t>2018</a:t>
+              <a:t>25 July 2018</a:t>
             </a:r>
             <a:endParaRPr lang="en-US" dirty="0"/>
           </a:p>
@@ -2253,21 +2496,6 @@
   <p:clrMapOvr>
     <a:masterClrMapping/>
   </p:clrMapOvr>
-  <mc:AlternateContent xmlns:mc="http://schemas.openxmlformats.org/markup-compatibility/2006">
-    <mc:Choice xmlns:p14="http://schemas.microsoft.com/office/powerpoint/2010/main" Requires="p14">
-      <p:transition p14:dur="0"/>
-    </mc:Choice>
-    <mc:Fallback>
-      <p:transition/>
-    </mc:Fallback>
-  </mc:AlternateContent>
-  <p:timing>
-    <p:tnLst>
-      <p:par>
-        <p:cTn id="1" dur="indefinite" restart="never" nodeType="tmRoot"/>
-      </p:par>
-    </p:tnLst>
-  </p:timing>
 </p:sld>
 </file>
 
@@ -2418,10 +2646,9 @@
           <a:lstStyle/>
           <a:p>
             <a:r>
-              <a:rPr lang="en-ZA" sz="3600" dirty="0" smtClean="0"/>
+              <a:rPr lang="en-ZA" sz="3600" dirty="0"/>
               <a:t>Weights make up the “brain”</a:t>
             </a:r>
-            <a:endParaRPr lang="en-ZA" sz="3600" dirty="0"/>
           </a:p>
         </p:txBody>
       </p:sp>
@@ -2465,21 +2692,631 @@
   <p:clrMapOvr>
     <a:masterClrMapping/>
   </p:clrMapOvr>
-  <mc:AlternateContent xmlns:mc="http://schemas.openxmlformats.org/markup-compatibility/2006">
-    <mc:Choice xmlns:p14="http://schemas.microsoft.com/office/powerpoint/2010/main" Requires="p14">
+  <mc:AlternateContent xmlns:mc="http://schemas.openxmlformats.org/markup-compatibility/2006" xmlns:p14="http://schemas.microsoft.com/office/powerpoint/2010/main">
+    <mc:Choice Requires="p14">
       <p:transition p14:dur="10"/>
     </mc:Choice>
-    <mc:Fallback>
+    <mc:Fallback xmlns="">
       <p:transition/>
     </mc:Fallback>
   </mc:AlternateContent>
-  <p:timing>
-    <p:tnLst>
-      <p:par>
-        <p:cTn id="1" dur="indefinite" restart="never" nodeType="tmRoot"/>
-      </p:par>
-    </p:tnLst>
-  </p:timing>
+</p:sld>
+</file>
+
+<file path=ppt/slides/slide11.xml><?xml version="1.0" encoding="utf-8"?>
+<p:sld xmlns:a="http://schemas.openxmlformats.org/drawingml/2006/main" xmlns:r="http://schemas.openxmlformats.org/officeDocument/2006/relationships" xmlns:p="http://schemas.openxmlformats.org/presentationml/2006/main">
+  <p:cSld>
+    <p:spTree>
+      <p:nvGrpSpPr>
+        <p:cNvPr id="1" name=""/>
+        <p:cNvGrpSpPr/>
+        <p:nvPr/>
+      </p:nvGrpSpPr>
+      <p:grpSpPr>
+        <a:xfrm>
+          <a:off x="0" y="0"/>
+          <a:ext cx="0" cy="0"/>
+          <a:chOff x="0" y="0"/>
+          <a:chExt cx="0" cy="0"/>
+        </a:xfrm>
+      </p:grpSpPr>
+      <p:pic>
+        <p:nvPicPr>
+          <p:cNvPr id="47" name="Picture 46"/>
+          <p:cNvPicPr>
+            <a:picLocks noChangeAspect="1"/>
+          </p:cNvPicPr>
+          <p:nvPr/>
+        </p:nvPicPr>
+        <p:blipFill>
+          <a:blip r:embed="rId3" cstate="print">
+            <a:extLst>
+              <a:ext uri="{28A0092B-C50C-407E-A947-70E740481C1C}">
+                <a14:useLocalDpi xmlns:a14="http://schemas.microsoft.com/office/drawing/2010/main" val="0"/>
+              </a:ext>
+            </a:extLst>
+          </a:blip>
+          <a:stretch>
+            <a:fillRect/>
+          </a:stretch>
+        </p:blipFill>
+        <p:spPr>
+          <a:xfrm rot="16200000">
+            <a:off x="-3384280" y="3366281"/>
+            <a:ext cx="6876000" cy="107438"/>
+          </a:xfrm>
+          <a:prstGeom prst="rect">
+            <a:avLst/>
+          </a:prstGeom>
+        </p:spPr>
+      </p:pic>
+      <p:sp>
+        <p:nvSpPr>
+          <p:cNvPr id="48" name="Rectangle 47"/>
+          <p:cNvSpPr/>
+          <p:nvPr/>
+        </p:nvSpPr>
+        <p:spPr>
+          <a:xfrm>
+            <a:off x="1095590" y="6498002"/>
+            <a:ext cx="2742610" cy="276999"/>
+          </a:xfrm>
+          <a:prstGeom prst="rect">
+            <a:avLst/>
+          </a:prstGeom>
+        </p:spPr>
+        <p:txBody>
+          <a:bodyPr wrap="none">
+            <a:spAutoFit/>
+          </a:bodyPr>
+          <a:lstStyle/>
+          <a:p>
+            <a:pPr algn="ctr"/>
+            <a:r>
+              <a:rPr lang="sk-SK" sz="1200" dirty="0">
+                <a:solidFill>
+                  <a:schemeClr val="bg1">
+                    <a:lumMod val="65000"/>
+                  </a:schemeClr>
+                </a:solidFill>
+              </a:rPr>
+              <a:t>© </a:t>
+            </a:r>
+            <a:r>
+              <a:rPr lang="id-ID" sz="1200" dirty="0">
+                <a:solidFill>
+                  <a:schemeClr val="bg1">
+                    <a:lumMod val="65000"/>
+                  </a:schemeClr>
+                </a:solidFill>
+              </a:rPr>
+              <a:t>Copyright Bumblebee Consulting 201</a:t>
+            </a:r>
+            <a:r>
+              <a:rPr lang="en-ZA" sz="1200" dirty="0">
+                <a:solidFill>
+                  <a:schemeClr val="bg1">
+                    <a:lumMod val="65000"/>
+                  </a:schemeClr>
+                </a:solidFill>
+              </a:rPr>
+              <a:t>8</a:t>
+            </a:r>
+            <a:endParaRPr lang="id-ID" sz="1200" dirty="0">
+              <a:solidFill>
+                <a:schemeClr val="bg1">
+                  <a:lumMod val="65000"/>
+                </a:schemeClr>
+              </a:solidFill>
+            </a:endParaRPr>
+          </a:p>
+        </p:txBody>
+      </p:sp>
+      <p:sp>
+        <p:nvSpPr>
+          <p:cNvPr id="9" name="TextBox 8"/>
+          <p:cNvSpPr txBox="1"/>
+          <p:nvPr/>
+        </p:nvSpPr>
+        <p:spPr>
+          <a:xfrm>
+            <a:off x="2821345" y="680625"/>
+            <a:ext cx="6988479" cy="646331"/>
+          </a:xfrm>
+          <a:prstGeom prst="rect">
+            <a:avLst/>
+          </a:prstGeom>
+        </p:spPr>
+        <p:style>
+          <a:lnRef idx="2">
+            <a:schemeClr val="accent4">
+              <a:shade val="50000"/>
+            </a:schemeClr>
+          </a:lnRef>
+          <a:fillRef idx="1">
+            <a:schemeClr val="accent4"/>
+          </a:fillRef>
+          <a:effectRef idx="0">
+            <a:schemeClr val="accent4"/>
+          </a:effectRef>
+          <a:fontRef idx="minor">
+            <a:schemeClr val="lt1"/>
+          </a:fontRef>
+        </p:style>
+        <p:txBody>
+          <a:bodyPr wrap="square" rtlCol="0">
+            <a:spAutoFit/>
+          </a:bodyPr>
+          <a:lstStyle/>
+          <a:p>
+            <a:pPr algn="ctr"/>
+            <a:r>
+              <a:rPr lang="en-ZA" sz="3600" dirty="0"/>
+              <a:t>Demo</a:t>
+            </a:r>
+          </a:p>
+        </p:txBody>
+      </p:sp>
+    </p:spTree>
+    <p:extLst>
+      <p:ext uri="{BB962C8B-B14F-4D97-AF65-F5344CB8AC3E}">
+        <p14:creationId xmlns:p14="http://schemas.microsoft.com/office/powerpoint/2010/main" val="4088318664"/>
+      </p:ext>
+    </p:extLst>
+  </p:cSld>
+  <p:clrMapOvr>
+    <a:masterClrMapping/>
+  </p:clrMapOvr>
+  <mc:AlternateContent xmlns:mc="http://schemas.openxmlformats.org/markup-compatibility/2006" xmlns:p14="http://schemas.microsoft.com/office/powerpoint/2010/main">
+    <mc:Choice Requires="p14">
+      <p:transition p14:dur="10"/>
+    </mc:Choice>
+    <mc:Fallback xmlns="">
+      <p:transition/>
+    </mc:Fallback>
+  </mc:AlternateContent>
+</p:sld>
+</file>
+
+<file path=ppt/slides/slide12.xml><?xml version="1.0" encoding="utf-8"?>
+<p:sld xmlns:a="http://schemas.openxmlformats.org/drawingml/2006/main" xmlns:r="http://schemas.openxmlformats.org/officeDocument/2006/relationships" xmlns:p="http://schemas.openxmlformats.org/presentationml/2006/main">
+  <p:cSld>
+    <p:spTree>
+      <p:nvGrpSpPr>
+        <p:cNvPr id="1" name=""/>
+        <p:cNvGrpSpPr/>
+        <p:nvPr/>
+      </p:nvGrpSpPr>
+      <p:grpSpPr>
+        <a:xfrm>
+          <a:off x="0" y="0"/>
+          <a:ext cx="0" cy="0"/>
+          <a:chOff x="0" y="0"/>
+          <a:chExt cx="0" cy="0"/>
+        </a:xfrm>
+      </p:grpSpPr>
+      <p:pic>
+        <p:nvPicPr>
+          <p:cNvPr id="47" name="Picture 46"/>
+          <p:cNvPicPr>
+            <a:picLocks noChangeAspect="1"/>
+          </p:cNvPicPr>
+          <p:nvPr/>
+        </p:nvPicPr>
+        <p:blipFill>
+          <a:blip r:embed="rId3" cstate="print">
+            <a:extLst>
+              <a:ext uri="{28A0092B-C50C-407E-A947-70E740481C1C}">
+                <a14:useLocalDpi xmlns:a14="http://schemas.microsoft.com/office/drawing/2010/main" val="0"/>
+              </a:ext>
+            </a:extLst>
+          </a:blip>
+          <a:stretch>
+            <a:fillRect/>
+          </a:stretch>
+        </p:blipFill>
+        <p:spPr>
+          <a:xfrm rot="16200000">
+            <a:off x="-3384280" y="3366281"/>
+            <a:ext cx="6876000" cy="107438"/>
+          </a:xfrm>
+          <a:prstGeom prst="rect">
+            <a:avLst/>
+          </a:prstGeom>
+        </p:spPr>
+      </p:pic>
+      <p:sp>
+        <p:nvSpPr>
+          <p:cNvPr id="48" name="Rectangle 47"/>
+          <p:cNvSpPr/>
+          <p:nvPr/>
+        </p:nvSpPr>
+        <p:spPr>
+          <a:xfrm>
+            <a:off x="1095590" y="6498002"/>
+            <a:ext cx="2742610" cy="276999"/>
+          </a:xfrm>
+          <a:prstGeom prst="rect">
+            <a:avLst/>
+          </a:prstGeom>
+        </p:spPr>
+        <p:txBody>
+          <a:bodyPr wrap="none">
+            <a:spAutoFit/>
+          </a:bodyPr>
+          <a:lstStyle/>
+          <a:p>
+            <a:pPr algn="ctr"/>
+            <a:r>
+              <a:rPr lang="sk-SK" sz="1200" dirty="0">
+                <a:solidFill>
+                  <a:schemeClr val="bg1">
+                    <a:lumMod val="65000"/>
+                  </a:schemeClr>
+                </a:solidFill>
+              </a:rPr>
+              <a:t>© </a:t>
+            </a:r>
+            <a:r>
+              <a:rPr lang="id-ID" sz="1200" dirty="0">
+                <a:solidFill>
+                  <a:schemeClr val="bg1">
+                    <a:lumMod val="65000"/>
+                  </a:schemeClr>
+                </a:solidFill>
+              </a:rPr>
+              <a:t>Copyright Bumblebee Consulting 201</a:t>
+            </a:r>
+            <a:r>
+              <a:rPr lang="en-ZA" sz="1200" dirty="0">
+                <a:solidFill>
+                  <a:schemeClr val="bg1">
+                    <a:lumMod val="65000"/>
+                  </a:schemeClr>
+                </a:solidFill>
+              </a:rPr>
+              <a:t>8</a:t>
+            </a:r>
+            <a:endParaRPr lang="id-ID" sz="1200" dirty="0">
+              <a:solidFill>
+                <a:schemeClr val="bg1">
+                  <a:lumMod val="65000"/>
+                </a:schemeClr>
+              </a:solidFill>
+            </a:endParaRPr>
+          </a:p>
+        </p:txBody>
+      </p:sp>
+      <p:sp>
+        <p:nvSpPr>
+          <p:cNvPr id="9" name="TextBox 8"/>
+          <p:cNvSpPr txBox="1"/>
+          <p:nvPr/>
+        </p:nvSpPr>
+        <p:spPr>
+          <a:xfrm>
+            <a:off x="4347427" y="506493"/>
+            <a:ext cx="3274655" cy="651025"/>
+          </a:xfrm>
+          <a:prstGeom prst="rect">
+            <a:avLst/>
+          </a:prstGeom>
+        </p:spPr>
+        <p:style>
+          <a:lnRef idx="2">
+            <a:schemeClr val="accent4">
+              <a:shade val="50000"/>
+            </a:schemeClr>
+          </a:lnRef>
+          <a:fillRef idx="1">
+            <a:schemeClr val="accent4"/>
+          </a:fillRef>
+          <a:effectRef idx="0">
+            <a:schemeClr val="accent4"/>
+          </a:effectRef>
+          <a:fontRef idx="minor">
+            <a:schemeClr val="lt1"/>
+          </a:fontRef>
+        </p:style>
+        <p:txBody>
+          <a:bodyPr wrap="square" rtlCol="0">
+            <a:spAutoFit/>
+          </a:bodyPr>
+          <a:lstStyle/>
+          <a:p>
+            <a:pPr algn="ctr"/>
+            <a:r>
+              <a:rPr lang="en-ZA" sz="3600" dirty="0"/>
+              <a:t>Gate Topology</a:t>
+            </a:r>
+          </a:p>
+        </p:txBody>
+      </p:sp>
+      <p:pic>
+        <p:nvPicPr>
+          <p:cNvPr id="7" name="Picture 6">
+            <a:extLst>
+              <a:ext uri="{FF2B5EF4-FFF2-40B4-BE49-F238E27FC236}">
+                <a16:creationId xmlns:a16="http://schemas.microsoft.com/office/drawing/2014/main" id="{40255808-17B9-4B7B-BF02-CB040ADEA7AB}"/>
+              </a:ext>
+            </a:extLst>
+          </p:cNvPr>
+          <p:cNvPicPr>
+            <a:picLocks noChangeAspect="1"/>
+          </p:cNvPicPr>
+          <p:nvPr/>
+        </p:nvPicPr>
+        <p:blipFill rotWithShape="1">
+          <a:blip r:embed="rId4">
+            <a:extLst>
+              <a:ext uri="{28A0092B-C50C-407E-A947-70E740481C1C}">
+                <a14:useLocalDpi xmlns:a14="http://schemas.microsoft.com/office/drawing/2010/main" val="0"/>
+              </a:ext>
+            </a:extLst>
+          </a:blip>
+          <a:srcRect r="20756" b="14138"/>
+          <a:stretch/>
+        </p:blipFill>
+        <p:spPr>
+          <a:xfrm>
+            <a:off x="2436241" y="1233996"/>
+            <a:ext cx="6956333" cy="5050920"/>
+          </a:xfrm>
+          <a:prstGeom prst="rect">
+            <a:avLst/>
+          </a:prstGeom>
+        </p:spPr>
+      </p:pic>
+    </p:spTree>
+    <p:extLst>
+      <p:ext uri="{BB962C8B-B14F-4D97-AF65-F5344CB8AC3E}">
+        <p14:creationId xmlns:p14="http://schemas.microsoft.com/office/powerpoint/2010/main" val="627953121"/>
+      </p:ext>
+    </p:extLst>
+  </p:cSld>
+  <p:clrMapOvr>
+    <a:masterClrMapping/>
+  </p:clrMapOvr>
+  <mc:AlternateContent xmlns:mc="http://schemas.openxmlformats.org/markup-compatibility/2006" xmlns:p14="http://schemas.microsoft.com/office/powerpoint/2010/main">
+    <mc:Choice Requires="p14">
+      <p:transition p14:dur="10"/>
+    </mc:Choice>
+    <mc:Fallback xmlns="">
+      <p:transition/>
+    </mc:Fallback>
+  </mc:AlternateContent>
+</p:sld>
+</file>
+
+<file path=ppt/slides/slide13.xml><?xml version="1.0" encoding="utf-8"?>
+<p:sld xmlns:a="http://schemas.openxmlformats.org/drawingml/2006/main" xmlns:r="http://schemas.openxmlformats.org/officeDocument/2006/relationships" xmlns:p="http://schemas.openxmlformats.org/presentationml/2006/main">
+  <p:cSld>
+    <p:spTree>
+      <p:nvGrpSpPr>
+        <p:cNvPr id="1" name=""/>
+        <p:cNvGrpSpPr/>
+        <p:nvPr/>
+      </p:nvGrpSpPr>
+      <p:grpSpPr>
+        <a:xfrm>
+          <a:off x="0" y="0"/>
+          <a:ext cx="0" cy="0"/>
+          <a:chOff x="0" y="0"/>
+          <a:chExt cx="0" cy="0"/>
+        </a:xfrm>
+      </p:grpSpPr>
+      <p:pic>
+        <p:nvPicPr>
+          <p:cNvPr id="47" name="Picture 46"/>
+          <p:cNvPicPr>
+            <a:picLocks noChangeAspect="1"/>
+          </p:cNvPicPr>
+          <p:nvPr/>
+        </p:nvPicPr>
+        <p:blipFill>
+          <a:blip r:embed="rId3" cstate="print">
+            <a:extLst>
+              <a:ext uri="{28A0092B-C50C-407E-A947-70E740481C1C}">
+                <a14:useLocalDpi xmlns:a14="http://schemas.microsoft.com/office/drawing/2010/main" val="0"/>
+              </a:ext>
+            </a:extLst>
+          </a:blip>
+          <a:stretch>
+            <a:fillRect/>
+          </a:stretch>
+        </p:blipFill>
+        <p:spPr>
+          <a:xfrm rot="16200000">
+            <a:off x="-3384280" y="3366281"/>
+            <a:ext cx="6876000" cy="107438"/>
+          </a:xfrm>
+          <a:prstGeom prst="rect">
+            <a:avLst/>
+          </a:prstGeom>
+        </p:spPr>
+      </p:pic>
+      <p:sp>
+        <p:nvSpPr>
+          <p:cNvPr id="48" name="Rectangle 47"/>
+          <p:cNvSpPr/>
+          <p:nvPr/>
+        </p:nvSpPr>
+        <p:spPr>
+          <a:xfrm>
+            <a:off x="1095590" y="6498002"/>
+            <a:ext cx="2742610" cy="276999"/>
+          </a:xfrm>
+          <a:prstGeom prst="rect">
+            <a:avLst/>
+          </a:prstGeom>
+        </p:spPr>
+        <p:txBody>
+          <a:bodyPr wrap="none">
+            <a:spAutoFit/>
+          </a:bodyPr>
+          <a:lstStyle/>
+          <a:p>
+            <a:pPr algn="ctr"/>
+            <a:r>
+              <a:rPr lang="sk-SK" sz="1200" dirty="0">
+                <a:solidFill>
+                  <a:schemeClr val="bg1">
+                    <a:lumMod val="65000"/>
+                  </a:schemeClr>
+                </a:solidFill>
+              </a:rPr>
+              <a:t>© </a:t>
+            </a:r>
+            <a:r>
+              <a:rPr lang="id-ID" sz="1200" dirty="0">
+                <a:solidFill>
+                  <a:schemeClr val="bg1">
+                    <a:lumMod val="65000"/>
+                  </a:schemeClr>
+                </a:solidFill>
+              </a:rPr>
+              <a:t>Copyright Bumblebee Consulting 201</a:t>
+            </a:r>
+            <a:r>
+              <a:rPr lang="en-ZA" sz="1200" dirty="0">
+                <a:solidFill>
+                  <a:schemeClr val="bg1">
+                    <a:lumMod val="65000"/>
+                  </a:schemeClr>
+                </a:solidFill>
+              </a:rPr>
+              <a:t>8</a:t>
+            </a:r>
+            <a:endParaRPr lang="id-ID" sz="1200" dirty="0">
+              <a:solidFill>
+                <a:schemeClr val="bg1">
+                  <a:lumMod val="65000"/>
+                </a:schemeClr>
+              </a:solidFill>
+            </a:endParaRPr>
+          </a:p>
+        </p:txBody>
+      </p:sp>
+      <p:sp>
+        <p:nvSpPr>
+          <p:cNvPr id="9" name="TextBox 8"/>
+          <p:cNvSpPr txBox="1"/>
+          <p:nvPr/>
+        </p:nvSpPr>
+        <p:spPr>
+          <a:xfrm>
+            <a:off x="3838200" y="627359"/>
+            <a:ext cx="3970072" cy="646331"/>
+          </a:xfrm>
+          <a:prstGeom prst="rect">
+            <a:avLst/>
+          </a:prstGeom>
+        </p:spPr>
+        <p:style>
+          <a:lnRef idx="2">
+            <a:schemeClr val="accent4">
+              <a:shade val="50000"/>
+            </a:schemeClr>
+          </a:lnRef>
+          <a:fillRef idx="1">
+            <a:schemeClr val="accent4"/>
+          </a:fillRef>
+          <a:effectRef idx="0">
+            <a:schemeClr val="accent4"/>
+          </a:effectRef>
+          <a:fontRef idx="minor">
+            <a:schemeClr val="lt1"/>
+          </a:fontRef>
+        </p:style>
+        <p:txBody>
+          <a:bodyPr wrap="square" rtlCol="0">
+            <a:spAutoFit/>
+          </a:bodyPr>
+          <a:lstStyle/>
+          <a:p>
+            <a:pPr algn="ctr"/>
+            <a:r>
+              <a:rPr lang="en-ZA" sz="3600" dirty="0"/>
+              <a:t>Further Reading</a:t>
+            </a:r>
+          </a:p>
+        </p:txBody>
+      </p:sp>
+      <p:sp>
+        <p:nvSpPr>
+          <p:cNvPr id="2" name="TextBox 1">
+            <a:extLst>
+              <a:ext uri="{FF2B5EF4-FFF2-40B4-BE49-F238E27FC236}">
+                <a16:creationId xmlns:a16="http://schemas.microsoft.com/office/drawing/2014/main" id="{A9DAB637-51DA-4DE8-AA2D-2C1FC6F29288}"/>
+              </a:ext>
+            </a:extLst>
+          </p:cNvPr>
+          <p:cNvSpPr txBox="1"/>
+          <p:nvPr/>
+        </p:nvSpPr>
+        <p:spPr>
+          <a:xfrm>
+            <a:off x="2837748" y="2712114"/>
+            <a:ext cx="6191118" cy="707886"/>
+          </a:xfrm>
+          <a:prstGeom prst="rect">
+            <a:avLst/>
+          </a:prstGeom>
+          <a:noFill/>
+        </p:spPr>
+        <p:txBody>
+          <a:bodyPr wrap="none" rtlCol="0">
+            <a:spAutoFit/>
+          </a:bodyPr>
+          <a:lstStyle/>
+          <a:p>
+            <a:pPr marL="285750" indent="-285750">
+              <a:buFont typeface="Arial" panose="020B0604020202020204" pitchFamily="34" charset="0"/>
+              <a:buChar char="•"/>
+            </a:pPr>
+            <a:r>
+              <a:rPr lang="en-ZA" sz="2000" dirty="0">
+                <a:solidFill>
+                  <a:srgbClr val="00B050"/>
+                </a:solidFill>
+              </a:rPr>
+              <a:t>http://bumbee.co.za/</a:t>
+            </a:r>
+          </a:p>
+          <a:p>
+            <a:pPr marL="285750" indent="-285750">
+              <a:buFont typeface="Arial" panose="020B0604020202020204" pitchFamily="34" charset="0"/>
+              <a:buChar char="•"/>
+            </a:pPr>
+            <a:r>
+              <a:rPr lang="en-ZA" sz="2000" dirty="0">
+                <a:solidFill>
+                  <a:srgbClr val="00B050"/>
+                </a:solidFill>
+              </a:rPr>
+              <a:t>https://github.com/pcfour/deep-learning-presentation</a:t>
+            </a:r>
+          </a:p>
+        </p:txBody>
+      </p:sp>
+    </p:spTree>
+    <p:extLst>
+      <p:ext uri="{BB962C8B-B14F-4D97-AF65-F5344CB8AC3E}">
+        <p14:creationId xmlns:p14="http://schemas.microsoft.com/office/powerpoint/2010/main" val="3312518476"/>
+      </p:ext>
+    </p:extLst>
+  </p:cSld>
+  <p:clrMapOvr>
+    <a:masterClrMapping/>
+  </p:clrMapOvr>
+  <mc:AlternateContent xmlns:mc="http://schemas.openxmlformats.org/markup-compatibility/2006" xmlns:p14="http://schemas.microsoft.com/office/powerpoint/2010/main">
+    <mc:Choice Requires="p14">
+      <p:transition p14:dur="10"/>
+    </mc:Choice>
+    <mc:Fallback xmlns="">
+      <p:transition/>
+    </mc:Fallback>
+  </mc:AlternateContent>
 </p:sld>
 </file>
 
@@ -2630,10 +3467,9 @@
           <a:lstStyle/>
           <a:p>
             <a:r>
-              <a:rPr lang="en-ZA" sz="2400" dirty="0" smtClean="0"/>
+              <a:rPr lang="en-ZA" sz="2400" dirty="0"/>
               <a:t>Vast Knowledge Space</a:t>
             </a:r>
-            <a:endParaRPr lang="en-ZA" sz="2400" dirty="0"/>
           </a:p>
         </p:txBody>
       </p:sp>
@@ -2677,21 +3513,14 @@
   <p:clrMapOvr>
     <a:masterClrMapping/>
   </p:clrMapOvr>
-  <mc:AlternateContent xmlns:mc="http://schemas.openxmlformats.org/markup-compatibility/2006">
-    <mc:Choice xmlns:p14="http://schemas.microsoft.com/office/powerpoint/2010/main" Requires="p14">
+  <mc:AlternateContent xmlns:mc="http://schemas.openxmlformats.org/markup-compatibility/2006" xmlns:p14="http://schemas.microsoft.com/office/powerpoint/2010/main">
+    <mc:Choice Requires="p14">
       <p:transition p14:dur="10"/>
     </mc:Choice>
-    <mc:Fallback>
+    <mc:Fallback xmlns="">
       <p:transition/>
     </mc:Fallback>
   </mc:AlternateContent>
-  <p:timing>
-    <p:tnLst>
-      <p:par>
-        <p:cTn id="1" dur="indefinite" restart="never" nodeType="tmRoot"/>
-      </p:par>
-    </p:tnLst>
-  </p:timing>
 </p:sld>
 </file>
 
@@ -2840,10 +3669,9 @@
           <a:lstStyle/>
           <a:p>
             <a:r>
-              <a:rPr lang="en-ZA" dirty="0" smtClean="0"/>
+              <a:rPr lang="en-ZA" dirty="0"/>
               <a:t>Classic Computing Model</a:t>
             </a:r>
-            <a:endParaRPr lang="en-ZA" dirty="0"/>
           </a:p>
         </p:txBody>
       </p:sp>
@@ -2924,10 +3752,9 @@
           <a:p>
             <a:pPr algn="ctr"/>
             <a:r>
-              <a:rPr lang="en-ZA" dirty="0" smtClean="0"/>
+              <a:rPr lang="en-ZA" dirty="0"/>
               <a:t>Input</a:t>
             </a:r>
-            <a:endParaRPr lang="en-ZA" dirty="0"/>
           </a:p>
         </p:txBody>
       </p:sp>
@@ -2968,10 +3795,9 @@
           <a:p>
             <a:pPr algn="ctr"/>
             <a:r>
-              <a:rPr lang="en-ZA" dirty="0" smtClean="0"/>
+              <a:rPr lang="en-ZA" dirty="0"/>
               <a:t>Rules</a:t>
             </a:r>
-            <a:endParaRPr lang="en-ZA" dirty="0"/>
           </a:p>
         </p:txBody>
       </p:sp>
@@ -3012,10 +3838,9 @@
           <a:p>
             <a:pPr algn="ctr"/>
             <a:r>
-              <a:rPr lang="en-ZA" dirty="0" smtClean="0"/>
+              <a:rPr lang="en-ZA" dirty="0"/>
               <a:t>Output</a:t>
             </a:r>
-            <a:endParaRPr lang="en-ZA" dirty="0"/>
           </a:p>
         </p:txBody>
       </p:sp>
@@ -3029,21 +3854,14 @@
   <p:clrMapOvr>
     <a:masterClrMapping/>
   </p:clrMapOvr>
-  <mc:AlternateContent xmlns:mc="http://schemas.openxmlformats.org/markup-compatibility/2006">
-    <mc:Choice xmlns:p14="http://schemas.microsoft.com/office/powerpoint/2010/main" Requires="p14">
+  <mc:AlternateContent xmlns:mc="http://schemas.openxmlformats.org/markup-compatibility/2006" xmlns:p14="http://schemas.microsoft.com/office/powerpoint/2010/main">
+    <mc:Choice Requires="p14">
       <p:transition p14:dur="10"/>
     </mc:Choice>
-    <mc:Fallback>
+    <mc:Fallback xmlns="">
       <p:transition/>
     </mc:Fallback>
   </mc:AlternateContent>
-  <p:timing>
-    <p:tnLst>
-      <p:par>
-        <p:cTn id="1" dur="indefinite" restart="never" nodeType="tmRoot"/>
-      </p:par>
-    </p:tnLst>
-  </p:timing>
 </p:sld>
 </file>
 
@@ -3192,10 +4010,9 @@
           <a:lstStyle/>
           <a:p>
             <a:r>
-              <a:rPr lang="en-ZA" dirty="0" smtClean="0"/>
+              <a:rPr lang="en-ZA" dirty="0"/>
               <a:t>Deep Learning Computing Model</a:t>
             </a:r>
-            <a:endParaRPr lang="en-ZA" dirty="0"/>
           </a:p>
         </p:txBody>
       </p:sp>
@@ -3276,10 +4093,9 @@
           <a:p>
             <a:pPr algn="ctr"/>
             <a:r>
-              <a:rPr lang="en-ZA" dirty="0" smtClean="0"/>
+              <a:rPr lang="en-ZA" dirty="0"/>
               <a:t>Input</a:t>
             </a:r>
-            <a:endParaRPr lang="en-ZA" dirty="0"/>
           </a:p>
         </p:txBody>
       </p:sp>
@@ -3320,10 +4136,9 @@
           <a:p>
             <a:pPr algn="ctr"/>
             <a:r>
-              <a:rPr lang="en-ZA" dirty="0" smtClean="0"/>
+              <a:rPr lang="en-ZA" dirty="0"/>
               <a:t>Output</a:t>
             </a:r>
-            <a:endParaRPr lang="en-ZA" dirty="0"/>
           </a:p>
         </p:txBody>
       </p:sp>
@@ -3364,10 +4179,9 @@
           <a:p>
             <a:pPr algn="ctr"/>
             <a:r>
-              <a:rPr lang="en-ZA" dirty="0" smtClean="0"/>
+              <a:rPr lang="en-ZA" dirty="0"/>
               <a:t>Rules</a:t>
             </a:r>
-            <a:endParaRPr lang="en-ZA" dirty="0"/>
           </a:p>
         </p:txBody>
       </p:sp>
@@ -3381,21 +4195,14 @@
   <p:clrMapOvr>
     <a:masterClrMapping/>
   </p:clrMapOvr>
-  <mc:AlternateContent xmlns:mc="http://schemas.openxmlformats.org/markup-compatibility/2006">
-    <mc:Choice xmlns:p14="http://schemas.microsoft.com/office/powerpoint/2010/main" Requires="p14">
+  <mc:AlternateContent xmlns:mc="http://schemas.openxmlformats.org/markup-compatibility/2006" xmlns:p14="http://schemas.microsoft.com/office/powerpoint/2010/main">
+    <mc:Choice Requires="p14">
       <p:transition p14:dur="10"/>
     </mc:Choice>
-    <mc:Fallback>
+    <mc:Fallback xmlns="">
       <p:transition/>
     </mc:Fallback>
   </mc:AlternateContent>
-  <p:timing>
-    <p:tnLst>
-      <p:par>
-        <p:cTn id="1" dur="indefinite" restart="never" nodeType="tmRoot"/>
-      </p:par>
-    </p:tnLst>
-  </p:timing>
 </p:sld>
 </file>
 
@@ -3546,10 +4353,9 @@
           <a:lstStyle/>
           <a:p>
             <a:r>
-              <a:rPr lang="en-ZA" sz="4000" dirty="0" smtClean="0"/>
+              <a:rPr lang="en-ZA" sz="4000" dirty="0"/>
               <a:t>Neural Networks</a:t>
             </a:r>
-            <a:endParaRPr lang="en-ZA" sz="4000" dirty="0"/>
           </a:p>
         </p:txBody>
       </p:sp>
@@ -3595,7 +4401,7 @@
               <a:buChar char="•"/>
             </a:pPr>
             <a:r>
-              <a:rPr lang="en-ZA" sz="3600" dirty="0" smtClean="0"/>
+              <a:rPr lang="en-ZA" sz="3600" dirty="0"/>
               <a:t>Modelled on the human brain</a:t>
             </a:r>
           </a:p>
@@ -3605,7 +4411,7 @@
               <a:buChar char="•"/>
             </a:pPr>
             <a:r>
-              <a:rPr lang="en-ZA" sz="3600" dirty="0" smtClean="0"/>
+              <a:rPr lang="en-ZA" sz="3600" dirty="0"/>
               <a:t>Connects neurons into layers</a:t>
             </a:r>
           </a:p>
@@ -3615,7 +4421,7 @@
               <a:buChar char="•"/>
             </a:pPr>
             <a:r>
-              <a:rPr lang="en-ZA" sz="3600" dirty="0" smtClean="0"/>
+              <a:rPr lang="en-ZA" sz="3600" dirty="0"/>
               <a:t>Start with an input layer</a:t>
             </a:r>
           </a:p>
@@ -3625,7 +4431,7 @@
               <a:buChar char="•"/>
             </a:pPr>
             <a:r>
-              <a:rPr lang="en-ZA" sz="3600" dirty="0" smtClean="0"/>
+              <a:rPr lang="en-ZA" sz="3600" dirty="0"/>
               <a:t>Connect it to hidden layers</a:t>
             </a:r>
           </a:p>
@@ -3635,7 +4441,7 @@
               <a:buChar char="•"/>
             </a:pPr>
             <a:r>
-              <a:rPr lang="en-ZA" sz="3600" dirty="0" smtClean="0"/>
+              <a:rPr lang="en-ZA" sz="3600" dirty="0"/>
               <a:t>Connect the last to an output layer</a:t>
             </a:r>
           </a:p>
@@ -3645,7 +4451,7 @@
               <a:buChar char="•"/>
             </a:pPr>
             <a:r>
-              <a:rPr lang="en-ZA" sz="3600" dirty="0" smtClean="0"/>
+              <a:rPr lang="en-ZA" sz="3600" dirty="0"/>
               <a:t>Use the output layer to predict</a:t>
             </a:r>
           </a:p>
@@ -3661,21 +4467,14 @@
   <p:clrMapOvr>
     <a:masterClrMapping/>
   </p:clrMapOvr>
-  <mc:AlternateContent xmlns:mc="http://schemas.openxmlformats.org/markup-compatibility/2006">
-    <mc:Choice xmlns:p14="http://schemas.microsoft.com/office/powerpoint/2010/main" Requires="p14">
+  <mc:AlternateContent xmlns:mc="http://schemas.openxmlformats.org/markup-compatibility/2006" xmlns:p14="http://schemas.microsoft.com/office/powerpoint/2010/main">
+    <mc:Choice Requires="p14">
       <p:transition p14:dur="10"/>
     </mc:Choice>
-    <mc:Fallback>
+    <mc:Fallback xmlns="">
       <p:transition/>
     </mc:Fallback>
   </mc:AlternateContent>
-  <p:timing>
-    <p:tnLst>
-      <p:par>
-        <p:cTn id="1" dur="indefinite" restart="never" nodeType="tmRoot"/>
-      </p:par>
-    </p:tnLst>
-  </p:timing>
 </p:sld>
 </file>
 
@@ -3826,10 +4625,9 @@
           <a:lstStyle/>
           <a:p>
             <a:r>
-              <a:rPr lang="en-ZA" sz="3600" dirty="0" smtClean="0"/>
+              <a:rPr lang="en-ZA" sz="3600" dirty="0"/>
               <a:t>Modelled on the human brain</a:t>
             </a:r>
-            <a:endParaRPr lang="en-ZA" sz="3600" dirty="0"/>
           </a:p>
         </p:txBody>
       </p:sp>
@@ -3873,21 +4671,14 @@
   <p:clrMapOvr>
     <a:masterClrMapping/>
   </p:clrMapOvr>
-  <mc:AlternateContent xmlns:mc="http://schemas.openxmlformats.org/markup-compatibility/2006">
-    <mc:Choice xmlns:p14="http://schemas.microsoft.com/office/powerpoint/2010/main" Requires="p14">
+  <mc:AlternateContent xmlns:mc="http://schemas.openxmlformats.org/markup-compatibility/2006" xmlns:p14="http://schemas.microsoft.com/office/powerpoint/2010/main">
+    <mc:Choice Requires="p14">
       <p:transition p14:dur="10"/>
     </mc:Choice>
-    <mc:Fallback>
+    <mc:Fallback xmlns="">
       <p:transition/>
     </mc:Fallback>
   </mc:AlternateContent>
-  <p:timing>
-    <p:tnLst>
-      <p:par>
-        <p:cTn id="1" dur="indefinite" restart="never" nodeType="tmRoot"/>
-      </p:par>
-    </p:tnLst>
-  </p:timing>
 </p:sld>
 </file>
 
@@ -4038,10 +4829,9 @@
           <a:lstStyle/>
           <a:p>
             <a:r>
-              <a:rPr lang="en-ZA" sz="3600" dirty="0" smtClean="0"/>
+              <a:rPr lang="en-ZA" sz="3600" dirty="0"/>
               <a:t>Artificial Neuron</a:t>
             </a:r>
-            <a:endParaRPr lang="en-ZA" sz="3600" dirty="0"/>
           </a:p>
         </p:txBody>
       </p:sp>
@@ -4085,21 +4875,14 @@
   <p:clrMapOvr>
     <a:masterClrMapping/>
   </p:clrMapOvr>
-  <mc:AlternateContent xmlns:mc="http://schemas.openxmlformats.org/markup-compatibility/2006">
-    <mc:Choice xmlns:p14="http://schemas.microsoft.com/office/powerpoint/2010/main" Requires="p14">
+  <mc:AlternateContent xmlns:mc="http://schemas.openxmlformats.org/markup-compatibility/2006" xmlns:p14="http://schemas.microsoft.com/office/powerpoint/2010/main">
+    <mc:Choice Requires="p14">
       <p:transition p14:dur="10"/>
     </mc:Choice>
-    <mc:Fallback>
+    <mc:Fallback xmlns="">
       <p:transition/>
     </mc:Fallback>
   </mc:AlternateContent>
-  <p:timing>
-    <p:tnLst>
-      <p:par>
-        <p:cTn id="1" dur="indefinite" restart="never" nodeType="tmRoot"/>
-      </p:par>
-    </p:tnLst>
-  </p:timing>
 </p:sld>
 </file>
 
@@ -4250,10 +5033,9 @@
           <a:lstStyle/>
           <a:p>
             <a:r>
-              <a:rPr lang="en-ZA" sz="3600" dirty="0" smtClean="0"/>
+              <a:rPr lang="en-ZA" sz="3600" dirty="0"/>
               <a:t>Neural Layers</a:t>
             </a:r>
-            <a:endParaRPr lang="en-ZA" sz="3600" dirty="0"/>
           </a:p>
         </p:txBody>
       </p:sp>
@@ -4297,21 +5079,14 @@
   <p:clrMapOvr>
     <a:masterClrMapping/>
   </p:clrMapOvr>
-  <mc:AlternateContent xmlns:mc="http://schemas.openxmlformats.org/markup-compatibility/2006">
-    <mc:Choice xmlns:p14="http://schemas.microsoft.com/office/powerpoint/2010/main" Requires="p14">
+  <mc:AlternateContent xmlns:mc="http://schemas.openxmlformats.org/markup-compatibility/2006" xmlns:p14="http://schemas.microsoft.com/office/powerpoint/2010/main">
+    <mc:Choice Requires="p14">
       <p:transition p14:dur="10"/>
     </mc:Choice>
-    <mc:Fallback>
+    <mc:Fallback xmlns="">
       <p:transition/>
     </mc:Fallback>
   </mc:AlternateContent>
-  <p:timing>
-    <p:tnLst>
-      <p:par>
-        <p:cTn id="1" dur="indefinite" restart="never" nodeType="tmRoot"/>
-      </p:par>
-    </p:tnLst>
-  </p:timing>
 </p:sld>
 </file>
 
@@ -4462,10 +5237,9 @@
           <a:lstStyle/>
           <a:p>
             <a:r>
-              <a:rPr lang="en-ZA" sz="3600" dirty="0" smtClean="0"/>
+              <a:rPr lang="en-ZA" sz="3600" dirty="0"/>
               <a:t>Activation Functions</a:t>
             </a:r>
-            <a:endParaRPr lang="en-ZA" sz="3600" dirty="0"/>
           </a:p>
         </p:txBody>
       </p:sp>
@@ -4509,21 +5283,14 @@
   <p:clrMapOvr>
     <a:masterClrMapping/>
   </p:clrMapOvr>
-  <mc:AlternateContent xmlns:mc="http://schemas.openxmlformats.org/markup-compatibility/2006">
-    <mc:Choice xmlns:p14="http://schemas.microsoft.com/office/powerpoint/2010/main" Requires="p14">
+  <mc:AlternateContent xmlns:mc="http://schemas.openxmlformats.org/markup-compatibility/2006" xmlns:p14="http://schemas.microsoft.com/office/powerpoint/2010/main">
+    <mc:Choice Requires="p14">
       <p:transition p14:dur="10"/>
     </mc:Choice>
-    <mc:Fallback>
+    <mc:Fallback xmlns="">
       <p:transition/>
     </mc:Fallback>
   </mc:AlternateContent>
-  <p:timing>
-    <p:tnLst>
-      <p:par>
-        <p:cTn id="1" dur="indefinite" restart="never" nodeType="tmRoot"/>
-      </p:par>
-    </p:tnLst>
-  </p:timing>
 </p:sld>
 </file>
 

</xml_diff>